<commit_message>
linear and relative layout task
</commit_message>
<xml_diff>
--- a/finalproject/team1/Macromarketdiscovery/Team1_Macromarketdiscovery_Dinesh_Presentation.pptx
+++ b/finalproject/team1/Macromarketdiscovery/Team1_Macromarketdiscovery_Dinesh_Presentation.pptx
@@ -296,6 +296,7 @@
           <a:p>
             <a:fld id="{21A09630-8512-402F-BB59-098690CDBE2F}" type="datetimeFigureOut">
               <a:rPr lang="en-US" smtClean="0"/>
+              <a:pPr/>
               <a:t>11/09/2019</a:t>
             </a:fld>
             <a:endParaRPr lang="en-US"/>
@@ -338,6 +339,7 @@
           <a:p>
             <a:fld id="{43BD380E-8736-4BDF-885B-F5A890633B93}" type="slidenum">
               <a:rPr lang="en-US" smtClean="0"/>
+              <a:pPr/>
               <a:t>‹#›</a:t>
             </a:fld>
             <a:endParaRPr lang="en-US"/>
@@ -461,6 +463,7 @@
           <a:p>
             <a:fld id="{21A09630-8512-402F-BB59-098690CDBE2F}" type="datetimeFigureOut">
               <a:rPr lang="en-US" smtClean="0"/>
+              <a:pPr/>
               <a:t>11/09/2019</a:t>
             </a:fld>
             <a:endParaRPr lang="en-US"/>
@@ -503,6 +506,7 @@
           <a:p>
             <a:fld id="{43BD380E-8736-4BDF-885B-F5A890633B93}" type="slidenum">
               <a:rPr lang="en-US" smtClean="0"/>
+              <a:pPr/>
               <a:t>‹#›</a:t>
             </a:fld>
             <a:endParaRPr lang="en-US"/>
@@ -636,6 +640,7 @@
           <a:p>
             <a:fld id="{21A09630-8512-402F-BB59-098690CDBE2F}" type="datetimeFigureOut">
               <a:rPr lang="en-US" smtClean="0"/>
+              <a:pPr/>
               <a:t>11/09/2019</a:t>
             </a:fld>
             <a:endParaRPr lang="en-US"/>
@@ -678,6 +683,7 @@
           <a:p>
             <a:fld id="{43BD380E-8736-4BDF-885B-F5A890633B93}" type="slidenum">
               <a:rPr lang="en-US" smtClean="0"/>
+              <a:pPr/>
               <a:t>‹#›</a:t>
             </a:fld>
             <a:endParaRPr lang="en-US"/>
@@ -801,6 +807,7 @@
           <a:p>
             <a:fld id="{21A09630-8512-402F-BB59-098690CDBE2F}" type="datetimeFigureOut">
               <a:rPr lang="en-US" smtClean="0"/>
+              <a:pPr/>
               <a:t>11/09/2019</a:t>
             </a:fld>
             <a:endParaRPr lang="en-US"/>
@@ -843,6 +850,7 @@
           <a:p>
             <a:fld id="{43BD380E-8736-4BDF-885B-F5A890633B93}" type="slidenum">
               <a:rPr lang="en-US" smtClean="0"/>
+              <a:pPr/>
               <a:t>‹#›</a:t>
             </a:fld>
             <a:endParaRPr lang="en-US"/>
@@ -1042,6 +1050,7 @@
           <a:p>
             <a:fld id="{21A09630-8512-402F-BB59-098690CDBE2F}" type="datetimeFigureOut">
               <a:rPr lang="en-US" smtClean="0"/>
+              <a:pPr/>
               <a:t>11/09/2019</a:t>
             </a:fld>
             <a:endParaRPr lang="en-US"/>
@@ -1084,6 +1093,7 @@
           <a:p>
             <a:fld id="{43BD380E-8736-4BDF-885B-F5A890633B93}" type="slidenum">
               <a:rPr lang="en-US" smtClean="0"/>
+              <a:pPr/>
               <a:t>‹#›</a:t>
             </a:fld>
             <a:endParaRPr lang="en-US"/>
@@ -1325,6 +1335,7 @@
           <a:p>
             <a:fld id="{21A09630-8512-402F-BB59-098690CDBE2F}" type="datetimeFigureOut">
               <a:rPr lang="en-US" smtClean="0"/>
+              <a:pPr/>
               <a:t>11/09/2019</a:t>
             </a:fld>
             <a:endParaRPr lang="en-US"/>
@@ -1367,6 +1378,7 @@
           <a:p>
             <a:fld id="{43BD380E-8736-4BDF-885B-F5A890633B93}" type="slidenum">
               <a:rPr lang="en-US" smtClean="0"/>
+              <a:pPr/>
               <a:t>‹#›</a:t>
             </a:fld>
             <a:endParaRPr lang="en-US"/>
@@ -1742,6 +1754,7 @@
           <a:p>
             <a:fld id="{21A09630-8512-402F-BB59-098690CDBE2F}" type="datetimeFigureOut">
               <a:rPr lang="en-US" smtClean="0"/>
+              <a:pPr/>
               <a:t>11/09/2019</a:t>
             </a:fld>
             <a:endParaRPr lang="en-US"/>
@@ -1784,6 +1797,7 @@
           <a:p>
             <a:fld id="{43BD380E-8736-4BDF-885B-F5A890633B93}" type="slidenum">
               <a:rPr lang="en-US" smtClean="0"/>
+              <a:pPr/>
               <a:t>‹#›</a:t>
             </a:fld>
             <a:endParaRPr lang="en-US"/>
@@ -1855,6 +1869,7 @@
           <a:p>
             <a:fld id="{21A09630-8512-402F-BB59-098690CDBE2F}" type="datetimeFigureOut">
               <a:rPr lang="en-US" smtClean="0"/>
+              <a:pPr/>
               <a:t>11/09/2019</a:t>
             </a:fld>
             <a:endParaRPr lang="en-US"/>
@@ -1897,6 +1912,7 @@
           <a:p>
             <a:fld id="{43BD380E-8736-4BDF-885B-F5A890633B93}" type="slidenum">
               <a:rPr lang="en-US" smtClean="0"/>
+              <a:pPr/>
               <a:t>‹#›</a:t>
             </a:fld>
             <a:endParaRPr lang="en-US"/>
@@ -1945,6 +1961,7 @@
           <a:p>
             <a:fld id="{21A09630-8512-402F-BB59-098690CDBE2F}" type="datetimeFigureOut">
               <a:rPr lang="en-US" smtClean="0"/>
+              <a:pPr/>
               <a:t>11/09/2019</a:t>
             </a:fld>
             <a:endParaRPr lang="en-US"/>
@@ -1987,6 +2004,7 @@
           <a:p>
             <a:fld id="{43BD380E-8736-4BDF-885B-F5A890633B93}" type="slidenum">
               <a:rPr lang="en-US" smtClean="0"/>
+              <a:pPr/>
               <a:t>‹#›</a:t>
             </a:fld>
             <a:endParaRPr lang="en-US"/>
@@ -2217,6 +2235,7 @@
           <a:p>
             <a:fld id="{21A09630-8512-402F-BB59-098690CDBE2F}" type="datetimeFigureOut">
               <a:rPr lang="en-US" smtClean="0"/>
+              <a:pPr/>
               <a:t>11/09/2019</a:t>
             </a:fld>
             <a:endParaRPr lang="en-US"/>
@@ -2259,6 +2278,7 @@
           <a:p>
             <a:fld id="{43BD380E-8736-4BDF-885B-F5A890633B93}" type="slidenum">
               <a:rPr lang="en-US" smtClean="0"/>
+              <a:pPr/>
               <a:t>‹#›</a:t>
             </a:fld>
             <a:endParaRPr lang="en-US"/>
@@ -2465,6 +2485,7 @@
           <a:p>
             <a:fld id="{21A09630-8512-402F-BB59-098690CDBE2F}" type="datetimeFigureOut">
               <a:rPr lang="en-US" smtClean="0"/>
+              <a:pPr/>
               <a:t>11/09/2019</a:t>
             </a:fld>
             <a:endParaRPr lang="en-US"/>
@@ -2507,6 +2528,7 @@
           <a:p>
             <a:fld id="{43BD380E-8736-4BDF-885B-F5A890633B93}" type="slidenum">
               <a:rPr lang="en-US" smtClean="0"/>
+              <a:pPr/>
               <a:t>‹#›</a:t>
             </a:fld>
             <a:endParaRPr lang="en-US"/>
@@ -2673,6 +2695,7 @@
           <a:p>
             <a:fld id="{21A09630-8512-402F-BB59-098690CDBE2F}" type="datetimeFigureOut">
               <a:rPr lang="en-US" smtClean="0"/>
+              <a:pPr/>
               <a:t>11/09/2019</a:t>
             </a:fld>
             <a:endParaRPr lang="en-US"/>
@@ -2751,6 +2774,7 @@
           <a:p>
             <a:fld id="{43BD380E-8736-4BDF-885B-F5A890633B93}" type="slidenum">
               <a:rPr lang="en-US" smtClean="0"/>
+              <a:pPr/>
               <a:t>‹#›</a:t>
             </a:fld>
             <a:endParaRPr lang="en-US"/>
@@ -3051,8 +3075,8 @@
         </p:nvSpPr>
         <p:spPr>
           <a:xfrm>
-            <a:off x="1905000" y="990600"/>
-            <a:ext cx="5410200" cy="1938992"/>
+            <a:off x="838200" y="914400"/>
+            <a:ext cx="7391400" cy="1938992"/>
           </a:xfrm>
           <a:prstGeom prst="rect">
             <a:avLst/>
@@ -3088,7 +3112,13 @@
               <a:rPr lang="en-US" sz="4000" dirty="0" smtClean="0">
                 <a:latin typeface="Algerian" pitchFamily="82" charset="0"/>
               </a:rPr>
-              <a:t> MACRO-MARKETING</a:t>
+              <a:t> </a:t>
+            </a:r>
+            <a:r>
+              <a:rPr lang="en-US" sz="4000" dirty="0" smtClean="0">
+                <a:latin typeface="Algerian" pitchFamily="82" charset="0"/>
+              </a:rPr>
+              <a:t>MACRO-MARKET-DISCOVERY</a:t>
             </a:r>
             <a:endParaRPr lang="en-US" sz="4000" dirty="0">
               <a:latin typeface="Algerian" pitchFamily="82" charset="0"/>
@@ -4030,13 +4060,8 @@
             </a:pPr>
             <a:r>
               <a:rPr lang="en-US" sz="2400" dirty="0" smtClean="0"/>
-              <a:t>Chat center:-</a:t>
-            </a:r>
-            <a:r>
-              <a:rPr lang="en-US" sz="2400" dirty="0" smtClean="0"/>
-              <a:t>  employees</a:t>
-            </a:r>
-            <a:endParaRPr lang="en-US" sz="2400" dirty="0" smtClean="0"/>
+              <a:t>Chat center:-  employees</a:t>
+            </a:r>
           </a:p>
           <a:p>
             <a:pPr>

</xml_diff>